<commit_message>
Further refinements to all tables (except game events).  First introduction of test functions.
</commit_message>
<xml_diff>
--- a/tools/schema.pptx
+++ b/tools/schema.pptx
@@ -114,7 +114,7 @@
   </p:defaultTextStyle>
   <p:extLst>
     <p:ext uri="{EFAFB233-063F-42B5-8137-9DF3F51BA10A}">
-      <p15:sldGuideLst xmlns:p15="http://schemas.microsoft.com/office/powerpoint/2012/main">
+      <p15:sldGuideLst xmlns:p15="http://schemas.microsoft.com/office/powerpoint/2012/main" xmlns="">
         <p15:guide id="1" orient="horz" pos="2160">
           <p15:clr>
             <a:srgbClr val="A4A3A4"/>
@@ -213,7 +213,7 @@
           <a:p>
             <a:fld id="{E5C3572B-B504-4241-BED6-4B8AE9D8FF8C}" type="datetimeFigureOut">
               <a:rPr lang="en-US" smtClean="0"/>
-              <a:t>10/30/16</a:t>
+              <a:t>11/3/2016</a:t>
             </a:fld>
             <a:endParaRPr lang="en-US"/>
           </a:p>
@@ -814,453 +814,96 @@
           <a:lstStyle/>
           <a:p>
             <a:r>
-              <a:rPr lang="en-US" dirty="0" smtClean="0"/>
-              <a:t>Sample </a:t>
-            </a:r>
-            <a:r>
               <a:rPr lang="en-US" dirty="0" err="1" smtClean="0"/>
               <a:t>m_intData</a:t>
             </a:r>
-            <a:endParaRPr lang="en-US" dirty="0" smtClean="0"/>
-          </a:p>
-          <a:p>
-            <a:r>
-              <a:rPr lang="en-US" dirty="0" smtClean="0">
-                <a:effectLst/>
-              </a:rPr>
-              <a:t>[{'</a:t>
-            </a:r>
-            <a:r>
-              <a:rPr lang="en-US" dirty="0" err="1" smtClean="0">
-                <a:effectLst/>
-              </a:rPr>
-              <a:t>m_key</a:t>
-            </a:r>
-            <a:r>
-              <a:rPr lang="en-US" dirty="0" smtClean="0">
-                <a:effectLst/>
-              </a:rPr>
-              <a:t>': '</a:t>
-            </a:r>
-            <a:r>
-              <a:rPr lang="en-US" dirty="0" err="1" smtClean="0">
-                <a:effectLst/>
-              </a:rPr>
+            <a:r>
+              <a:rPr lang="en-US" baseline="0" dirty="0" smtClean="0"/>
+              <a:t> adjustments:</a:t>
+            </a:r>
+          </a:p>
+          <a:p>
+            <a:pPr marL="171450" indent="-171450">
+              <a:buFontTx/>
+              <a:buChar char="-"/>
+            </a:pPr>
+            <a:r>
+              <a:rPr lang="en-US" baseline="0" dirty="0" smtClean="0"/>
+              <a:t>Added ‘</a:t>
+            </a:r>
+            <a:r>
+              <a:rPr lang="en-US" baseline="0" dirty="0" err="1" smtClean="0"/>
+              <a:t>replayId</a:t>
+            </a:r>
+            <a:r>
+              <a:rPr lang="en-US" baseline="0" dirty="0" smtClean="0"/>
+              <a:t>’ and ‘_</a:t>
+            </a:r>
+            <a:r>
+              <a:rPr lang="en-US" baseline="0" dirty="0" err="1" smtClean="0"/>
+              <a:t>gameloop</a:t>
+            </a:r>
+            <a:r>
+              <a:rPr lang="en-US" baseline="0" dirty="0" smtClean="0"/>
+              <a:t>’ to track where data came from and when</a:t>
+            </a:r>
+          </a:p>
+          <a:p>
+            <a:pPr marL="171450" indent="-171450">
+              <a:buFontTx/>
+              <a:buChar char="-"/>
+            </a:pPr>
+            <a:r>
+              <a:rPr lang="en-US" baseline="0" dirty="0" smtClean="0"/>
+              <a:t>Replace ‘</a:t>
+            </a:r>
+            <a:r>
+              <a:rPr lang="en-US" baseline="0" dirty="0" err="1" smtClean="0"/>
               <a:t>PlayerID</a:t>
             </a:r>
             <a:r>
-              <a:rPr lang="en-US" dirty="0" smtClean="0">
-                <a:effectLst/>
-              </a:rPr>
-              <a:t>', '</a:t>
-            </a:r>
-            <a:r>
-              <a:rPr lang="en-US" dirty="0" err="1" smtClean="0">
-                <a:effectLst/>
-              </a:rPr>
-              <a:t>m_value</a:t>
-            </a:r>
-            <a:r>
-              <a:rPr lang="en-US" dirty="0" smtClean="0">
-                <a:effectLst/>
-              </a:rPr>
-              <a:t>': 2}, {'</a:t>
-            </a:r>
-            <a:r>
-              <a:rPr lang="en-US" dirty="0" err="1" smtClean="0">
-                <a:effectLst/>
-              </a:rPr>
-              <a:t>m_key</a:t>
-            </a:r>
-            <a:r>
-              <a:rPr lang="en-US" dirty="0" smtClean="0">
-                <a:effectLst/>
-              </a:rPr>
-              <a:t>': 'Level', '</a:t>
-            </a:r>
-            <a:r>
-              <a:rPr lang="en-US" dirty="0" err="1" smtClean="0">
-                <a:effectLst/>
-              </a:rPr>
-              <a:t>m_value</a:t>
-            </a:r>
-            <a:r>
-              <a:rPr lang="en-US" dirty="0" smtClean="0">
-                <a:effectLst/>
-              </a:rPr>
-              <a:t>': 22}]</a:t>
-            </a:r>
-            <a:endParaRPr lang="en-US" dirty="0" smtClean="0"/>
-          </a:p>
-          <a:p>
-            <a:endParaRPr lang="en-US" dirty="0" smtClean="0"/>
-          </a:p>
-          <a:p>
-            <a:r>
-              <a:rPr lang="en-US" dirty="0" smtClean="0"/>
-              <a:t>Sample </a:t>
-            </a:r>
-            <a:r>
-              <a:rPr lang="en-US" dirty="0" err="1" smtClean="0"/>
-              <a:t>m_stringData</a:t>
-            </a:r>
-            <a:endParaRPr lang="en-US" dirty="0" smtClean="0"/>
-          </a:p>
-          <a:p>
-            <a:r>
-              <a:rPr lang="en-US" dirty="0" smtClean="0">
-                <a:effectLst/>
-              </a:rPr>
-              <a:t>[{'</a:t>
-            </a:r>
-            <a:r>
-              <a:rPr lang="en-US" dirty="0" err="1" smtClean="0">
-                <a:effectLst/>
-              </a:rPr>
-              <a:t>m_key</a:t>
-            </a:r>
-            <a:r>
-              <a:rPr lang="en-US" dirty="0" smtClean="0">
-                <a:effectLst/>
-              </a:rPr>
-              <a:t>': 'Hero', '</a:t>
-            </a:r>
-            <a:r>
-              <a:rPr lang="en-US" dirty="0" err="1" smtClean="0">
-                <a:effectLst/>
-              </a:rPr>
-              <a:t>m_value</a:t>
-            </a:r>
-            <a:r>
-              <a:rPr lang="en-US" dirty="0" smtClean="0">
-                <a:effectLst/>
-              </a:rPr>
-              <a:t>': '</a:t>
-            </a:r>
-            <a:r>
-              <a:rPr lang="en-US" dirty="0" err="1" smtClean="0">
-                <a:effectLst/>
-              </a:rPr>
-              <a:t>HeroFalstad</a:t>
-            </a:r>
-            <a:r>
-              <a:rPr lang="en-US" dirty="0" smtClean="0">
-                <a:effectLst/>
-              </a:rPr>
-              <a:t>'}, {'</a:t>
-            </a:r>
-            <a:r>
-              <a:rPr lang="en-US" dirty="0" err="1" smtClean="0">
-                <a:effectLst/>
-              </a:rPr>
-              <a:t>m_key</a:t>
-            </a:r>
-            <a:r>
-              <a:rPr lang="en-US" dirty="0" smtClean="0">
-                <a:effectLst/>
-              </a:rPr>
-              <a:t>': 'Win/Loss', '</a:t>
-            </a:r>
-            <a:r>
-              <a:rPr lang="en-US" dirty="0" err="1" smtClean="0">
-                <a:effectLst/>
-              </a:rPr>
-              <a:t>m_value</a:t>
-            </a:r>
-            <a:r>
-              <a:rPr lang="en-US" dirty="0" smtClean="0">
-                <a:effectLst/>
-              </a:rPr>
-              <a:t>': 'Win'}, {'</a:t>
-            </a:r>
-            <a:r>
-              <a:rPr lang="en-US" dirty="0" err="1" smtClean="0">
-                <a:effectLst/>
-              </a:rPr>
-              <a:t>m_key</a:t>
-            </a:r>
-            <a:r>
-              <a:rPr lang="en-US" dirty="0" smtClean="0">
-                <a:effectLst/>
-              </a:rPr>
-              <a:t>': 'Map', '</a:t>
-            </a:r>
-            <a:r>
-              <a:rPr lang="en-US" dirty="0" err="1" smtClean="0">
-                <a:effectLst/>
-              </a:rPr>
-              <a:t>m_value</a:t>
-            </a:r>
-            <a:r>
-              <a:rPr lang="en-US" dirty="0" smtClean="0">
-                <a:effectLst/>
-              </a:rPr>
-              <a:t>': '</a:t>
-            </a:r>
-            <a:r>
-              <a:rPr lang="en-US" dirty="0" err="1" smtClean="0">
-                <a:effectLst/>
-              </a:rPr>
-              <a:t>BlackheartsBay</a:t>
-            </a:r>
-            <a:r>
-              <a:rPr lang="en-US" dirty="0" smtClean="0">
-                <a:effectLst/>
-              </a:rPr>
-              <a:t>'}, {'</a:t>
-            </a:r>
-            <a:r>
-              <a:rPr lang="en-US" dirty="0" err="1" smtClean="0">
-                <a:effectLst/>
-              </a:rPr>
-              <a:t>m_key</a:t>
-            </a:r>
-            <a:r>
-              <a:rPr lang="en-US" dirty="0" smtClean="0">
-                <a:effectLst/>
-              </a:rPr>
-              <a:t>': 'Tier 1 Choice', '</a:t>
-            </a:r>
-            <a:r>
-              <a:rPr lang="en-US" dirty="0" err="1" smtClean="0">
-                <a:effectLst/>
-              </a:rPr>
-              <a:t>m_value</a:t>
-            </a:r>
-            <a:r>
-              <a:rPr lang="en-US" dirty="0" smtClean="0">
-                <a:effectLst/>
-              </a:rPr>
-              <a:t>': '</a:t>
-            </a:r>
-            <a:r>
-              <a:rPr lang="en-US" dirty="0" err="1" smtClean="0">
-                <a:effectLst/>
-              </a:rPr>
-              <a:t>FalstadHammerangGatheringStorm</a:t>
-            </a:r>
-            <a:r>
-              <a:rPr lang="en-US" dirty="0" smtClean="0">
-                <a:effectLst/>
-              </a:rPr>
-              <a:t>'}, {'</a:t>
-            </a:r>
-            <a:r>
-              <a:rPr lang="en-US" dirty="0" err="1" smtClean="0">
-                <a:effectLst/>
-              </a:rPr>
-              <a:t>m_key</a:t>
-            </a:r>
-            <a:r>
-              <a:rPr lang="en-US" dirty="0" smtClean="0">
-                <a:effectLst/>
-              </a:rPr>
-              <a:t>': 'Tier 2 Choice', '</a:t>
-            </a:r>
-            <a:r>
-              <a:rPr lang="en-US" dirty="0" err="1" smtClean="0">
-                <a:effectLst/>
-              </a:rPr>
-              <a:t>m_value</a:t>
-            </a:r>
-            <a:r>
-              <a:rPr lang="en-US" dirty="0" smtClean="0">
-                <a:effectLst/>
-              </a:rPr>
-              <a:t>': '</a:t>
-            </a:r>
-            <a:r>
-              <a:rPr lang="en-US" dirty="0" err="1" smtClean="0">
-                <a:effectLst/>
-              </a:rPr>
-              <a:t>FalstadTalentHammerGains</a:t>
-            </a:r>
-            <a:r>
-              <a:rPr lang="en-US" dirty="0" smtClean="0">
-                <a:effectLst/>
-              </a:rPr>
-              <a:t>'}, {'</a:t>
-            </a:r>
-            <a:r>
-              <a:rPr lang="en-US" dirty="0" err="1" smtClean="0">
-                <a:effectLst/>
-              </a:rPr>
-              <a:t>m_key</a:t>
-            </a:r>
-            <a:r>
-              <a:rPr lang="en-US" dirty="0" smtClean="0">
-                <a:effectLst/>
-              </a:rPr>
-              <a:t>': 'Tier 3 Choice', '</a:t>
-            </a:r>
-            <a:r>
-              <a:rPr lang="en-US" dirty="0" err="1" smtClean="0">
-                <a:effectLst/>
-              </a:rPr>
-              <a:t>m_value</a:t>
-            </a:r>
-            <a:r>
-              <a:rPr lang="en-US" dirty="0" smtClean="0">
-                <a:effectLst/>
-              </a:rPr>
-              <a:t>': '</a:t>
-            </a:r>
-            <a:r>
-              <a:rPr lang="en-US" dirty="0" err="1" smtClean="0">
-                <a:effectLst/>
-              </a:rPr>
-              <a:t>FalstadMasteryBolterang</a:t>
-            </a:r>
-            <a:r>
-              <a:rPr lang="en-US" dirty="0" smtClean="0">
-                <a:effectLst/>
-              </a:rPr>
-              <a:t>'}, {'</a:t>
-            </a:r>
-            <a:r>
-              <a:rPr lang="en-US" dirty="0" err="1" smtClean="0">
-                <a:effectLst/>
-              </a:rPr>
-              <a:t>m_key</a:t>
-            </a:r>
-            <a:r>
-              <a:rPr lang="en-US" dirty="0" smtClean="0">
-                <a:effectLst/>
-              </a:rPr>
-              <a:t>': 'Tier 4 Choice', '</a:t>
-            </a:r>
-            <a:r>
-              <a:rPr lang="en-US" dirty="0" err="1" smtClean="0">
-                <a:effectLst/>
-              </a:rPr>
-              <a:t>m_value</a:t>
-            </a:r>
-            <a:r>
-              <a:rPr lang="en-US" dirty="0" smtClean="0">
-                <a:effectLst/>
-              </a:rPr>
-              <a:t>': '</a:t>
-            </a:r>
-            <a:r>
-              <a:rPr lang="en-US" dirty="0" err="1" smtClean="0">
-                <a:effectLst/>
-              </a:rPr>
-              <a:t>FalstadHeroicAbilityMightyGust</a:t>
-            </a:r>
-            <a:r>
-              <a:rPr lang="en-US" dirty="0" smtClean="0">
-                <a:effectLst/>
-              </a:rPr>
-              <a:t>'}, {'</a:t>
-            </a:r>
-            <a:r>
-              <a:rPr lang="en-US" dirty="0" err="1" smtClean="0">
-                <a:effectLst/>
-              </a:rPr>
-              <a:t>m_key</a:t>
-            </a:r>
-            <a:r>
-              <a:rPr lang="en-US" dirty="0" smtClean="0">
-                <a:effectLst/>
-              </a:rPr>
-              <a:t>': 'Tier 5 Choice', '</a:t>
-            </a:r>
-            <a:r>
-              <a:rPr lang="en-US" dirty="0" err="1" smtClean="0">
-                <a:effectLst/>
-              </a:rPr>
-              <a:t>m_value</a:t>
-            </a:r>
-            <a:r>
-              <a:rPr lang="en-US" dirty="0" smtClean="0">
-                <a:effectLst/>
-              </a:rPr>
-              <a:t>': '</a:t>
-            </a:r>
-            <a:r>
-              <a:rPr lang="en-US" dirty="0" err="1" smtClean="0">
-                <a:effectLst/>
-              </a:rPr>
-              <a:t>FalstadMasteryBarrelRollFlowRider</a:t>
-            </a:r>
-            <a:r>
-              <a:rPr lang="en-US" dirty="0" smtClean="0">
-                <a:effectLst/>
-              </a:rPr>
-              <a:t>'}, {'</a:t>
-            </a:r>
-            <a:r>
-              <a:rPr lang="en-US" dirty="0" err="1" smtClean="0">
-                <a:effectLst/>
-              </a:rPr>
-              <a:t>m_key</a:t>
-            </a:r>
-            <a:r>
-              <a:rPr lang="en-US" dirty="0" smtClean="0">
-                <a:effectLst/>
-              </a:rPr>
-              <a:t>': 'Tier 6 Choice', '</a:t>
-            </a:r>
-            <a:r>
-              <a:rPr lang="en-US" dirty="0" err="1" smtClean="0">
-                <a:effectLst/>
-              </a:rPr>
-              <a:t>m_value</a:t>
-            </a:r>
-            <a:r>
-              <a:rPr lang="en-US" dirty="0" smtClean="0">
-                <a:effectLst/>
-              </a:rPr>
-              <a:t>': '</a:t>
-            </a:r>
-            <a:r>
-              <a:rPr lang="en-US" dirty="0" err="1" smtClean="0">
-                <a:effectLst/>
-              </a:rPr>
-              <a:t>FalstadMasteryAerieGustsTailwind</a:t>
-            </a:r>
-            <a:r>
-              <a:rPr lang="en-US" dirty="0" smtClean="0">
-                <a:effectLst/>
-              </a:rPr>
-              <a:t>'}, {'</a:t>
-            </a:r>
-            <a:r>
-              <a:rPr lang="en-US" dirty="0" err="1" smtClean="0">
-                <a:effectLst/>
-              </a:rPr>
-              <a:t>m_key</a:t>
-            </a:r>
-            <a:r>
-              <a:rPr lang="en-US" dirty="0" smtClean="0">
-                <a:effectLst/>
-              </a:rPr>
-              <a:t>': 'Tier 7 Choice', '</a:t>
-            </a:r>
-            <a:r>
-              <a:rPr lang="en-US" dirty="0" err="1" smtClean="0">
-                <a:effectLst/>
-              </a:rPr>
-              <a:t>m_value</a:t>
-            </a:r>
-            <a:r>
-              <a:rPr lang="en-US" dirty="0" smtClean="0">
-                <a:effectLst/>
-              </a:rPr>
-              <a:t>': '</a:t>
-            </a:r>
-            <a:r>
-              <a:rPr lang="en-US" dirty="0" err="1" smtClean="0">
-                <a:effectLst/>
-              </a:rPr>
-              <a:t>FalstadMasteryFlightEpicMount</a:t>
-            </a:r>
-            <a:r>
-              <a:rPr lang="en-US" dirty="0" smtClean="0">
-                <a:effectLst/>
-              </a:rPr>
-              <a:t>'}]</a:t>
-            </a:r>
+              <a:rPr lang="en-US" baseline="0" dirty="0" smtClean="0"/>
+              <a:t>’, range(1,11) with ‘</a:t>
+            </a:r>
+            <a:r>
+              <a:rPr lang="en-US" baseline="0" dirty="0" err="1" smtClean="0"/>
+              <a:t>m_userId</a:t>
+            </a:r>
+            <a:r>
+              <a:rPr lang="en-US" baseline="0" dirty="0" smtClean="0"/>
+              <a:t>’, range(0,10) for consistent numbering of user ID</a:t>
+            </a:r>
+          </a:p>
+          <a:p>
+            <a:pPr marL="171450" indent="-171450">
+              <a:buFontTx/>
+              <a:buChar char="-"/>
+            </a:pPr>
+            <a:endParaRPr lang="en-US" baseline="0" dirty="0" smtClean="0"/>
+          </a:p>
+          <a:p>
+            <a:pPr marL="0" indent="0">
+              <a:buFontTx/>
+              <a:buNone/>
+            </a:pPr>
+            <a:r>
+              <a:rPr lang="en-US" baseline="0" dirty="0" smtClean="0"/>
+              <a:t>Consider removing </a:t>
+            </a:r>
+            <a:r>
+              <a:rPr lang="en-US" baseline="0" dirty="0" err="1" smtClean="0"/>
+              <a:t>parentTE</a:t>
+            </a:r>
+            <a:r>
+              <a:rPr lang="en-US" baseline="0" dirty="0" smtClean="0"/>
+              <a:t> completely and sending pertinent keys to the sub-tables?</a:t>
+            </a:r>
+          </a:p>
+          <a:p>
+            <a:pPr marL="0" indent="0">
+              <a:buFontTx/>
+              <a:buNone/>
+            </a:pPr>
             <a:endParaRPr lang="en-US" dirty="0"/>
           </a:p>
         </p:txBody>
@@ -2009,7 +1652,7 @@
           <a:p>
             <a:fld id="{CE21285F-E69F-4418-A392-A4F4A6F58DA9}" type="datetimeFigureOut">
               <a:rPr lang="en-US" smtClean="0"/>
-              <a:t>10/30/16</a:t>
+              <a:t>11/3/2016</a:t>
             </a:fld>
             <a:endParaRPr lang="en-US"/>
           </a:p>
@@ -2179,7 +1822,7 @@
           <a:p>
             <a:fld id="{CE21285F-E69F-4418-A392-A4F4A6F58DA9}" type="datetimeFigureOut">
               <a:rPr lang="en-US" smtClean="0"/>
-              <a:t>10/30/16</a:t>
+              <a:t>11/3/2016</a:t>
             </a:fld>
             <a:endParaRPr lang="en-US"/>
           </a:p>
@@ -2359,7 +2002,7 @@
           <a:p>
             <a:fld id="{CE21285F-E69F-4418-A392-A4F4A6F58DA9}" type="datetimeFigureOut">
               <a:rPr lang="en-US" smtClean="0"/>
-              <a:t>10/30/16</a:t>
+              <a:t>11/3/2016</a:t>
             </a:fld>
             <a:endParaRPr lang="en-US"/>
           </a:p>
@@ -2529,7 +2172,7 @@
           <a:p>
             <a:fld id="{CE21285F-E69F-4418-A392-A4F4A6F58DA9}" type="datetimeFigureOut">
               <a:rPr lang="en-US" smtClean="0"/>
-              <a:t>10/30/16</a:t>
+              <a:t>11/3/2016</a:t>
             </a:fld>
             <a:endParaRPr lang="en-US"/>
           </a:p>
@@ -2775,7 +2418,7 @@
           <a:p>
             <a:fld id="{CE21285F-E69F-4418-A392-A4F4A6F58DA9}" type="datetimeFigureOut">
               <a:rPr lang="en-US" smtClean="0"/>
-              <a:t>10/30/16</a:t>
+              <a:t>11/3/2016</a:t>
             </a:fld>
             <a:endParaRPr lang="en-US"/>
           </a:p>
@@ -3063,7 +2706,7 @@
           <a:p>
             <a:fld id="{CE21285F-E69F-4418-A392-A4F4A6F58DA9}" type="datetimeFigureOut">
               <a:rPr lang="en-US" smtClean="0"/>
-              <a:t>10/30/16</a:t>
+              <a:t>11/3/2016</a:t>
             </a:fld>
             <a:endParaRPr lang="en-US"/>
           </a:p>
@@ -3485,7 +3128,7 @@
           <a:p>
             <a:fld id="{CE21285F-E69F-4418-A392-A4F4A6F58DA9}" type="datetimeFigureOut">
               <a:rPr lang="en-US" smtClean="0"/>
-              <a:t>10/30/16</a:t>
+              <a:t>11/3/2016</a:t>
             </a:fld>
             <a:endParaRPr lang="en-US"/>
           </a:p>
@@ -3603,7 +3246,7 @@
           <a:p>
             <a:fld id="{CE21285F-E69F-4418-A392-A4F4A6F58DA9}" type="datetimeFigureOut">
               <a:rPr lang="en-US" smtClean="0"/>
-              <a:t>10/30/16</a:t>
+              <a:t>11/3/2016</a:t>
             </a:fld>
             <a:endParaRPr lang="en-US"/>
           </a:p>
@@ -3698,7 +3341,7 @@
           <a:p>
             <a:fld id="{CE21285F-E69F-4418-A392-A4F4A6F58DA9}" type="datetimeFigureOut">
               <a:rPr lang="en-US" smtClean="0"/>
-              <a:t>10/30/16</a:t>
+              <a:t>11/3/2016</a:t>
             </a:fld>
             <a:endParaRPr lang="en-US"/>
           </a:p>
@@ -3975,7 +3618,7 @@
           <a:p>
             <a:fld id="{CE21285F-E69F-4418-A392-A4F4A6F58DA9}" type="datetimeFigureOut">
               <a:rPr lang="en-US" smtClean="0"/>
-              <a:t>10/30/16</a:t>
+              <a:t>11/3/2016</a:t>
             </a:fld>
             <a:endParaRPr lang="en-US"/>
           </a:p>
@@ -4228,7 +3871,7 @@
           <a:p>
             <a:fld id="{CE21285F-E69F-4418-A392-A4F4A6F58DA9}" type="datetimeFigureOut">
               <a:rPr lang="en-US" smtClean="0"/>
-              <a:t>10/30/16</a:t>
+              <a:t>11/3/2016</a:t>
             </a:fld>
             <a:endParaRPr lang="en-US"/>
           </a:p>
@@ -4441,7 +4084,7 @@
           <a:p>
             <a:fld id="{CE21285F-E69F-4418-A392-A4F4A6F58DA9}" type="datetimeFigureOut">
               <a:rPr lang="en-US" smtClean="0"/>
-              <a:t>10/30/16</a:t>
+              <a:t>11/3/2016</a:t>
             </a:fld>
             <a:endParaRPr lang="en-US"/>
           </a:p>
@@ -6055,87 +5698,31 @@
           <a:p>
             <a:pPr algn="ctr"/>
             <a:r>
-              <a:rPr lang="en-US" sz="1000" dirty="0" err="1" smtClean="0"/>
+              <a:rPr lang="en-US" sz="1000" dirty="0" err="1" smtClean="0">
+                <a:solidFill>
+                  <a:srgbClr val="FF0000"/>
+                </a:solidFill>
+              </a:rPr>
               <a:t>m_defaultDifficulty</a:t>
             </a:r>
             <a:r>
-              <a:rPr lang="en-US" sz="1000" dirty="0" smtClean="0"/>
+              <a:rPr lang="en-US" sz="1000" dirty="0" smtClean="0">
+                <a:solidFill>
+                  <a:srgbClr val="FF0000"/>
+                </a:solidFill>
+              </a:rPr>
               <a:t> </a:t>
             </a:r>
           </a:p>
           <a:p>
             <a:pPr algn="ctr"/>
             <a:r>
-              <a:rPr lang="en-US" sz="1000" dirty="0" err="1" smtClean="0"/>
+              <a:rPr lang="en-US" sz="1000" dirty="0" err="1" smtClean="0">
+                <a:solidFill>
+                  <a:srgbClr val="FF0000"/>
+                </a:solidFill>
+              </a:rPr>
               <a:t>m_gameCacheName</a:t>
-            </a:r>
-            <a:endParaRPr lang="en-US" sz="1000" dirty="0" smtClean="0"/>
-          </a:p>
-          <a:p>
-            <a:pPr algn="ctr"/>
-            <a:r>
-              <a:rPr lang="en-US" sz="1000" dirty="0" err="1" smtClean="0"/>
-              <a:t>m_gameSpeed</a:t>
-            </a:r>
-            <a:endParaRPr lang="en-US" sz="1000" dirty="0" smtClean="0"/>
-          </a:p>
-          <a:p>
-            <a:pPr algn="ctr"/>
-            <a:r>
-              <a:rPr lang="en-US" sz="1000" dirty="0" err="1" smtClean="0"/>
-              <a:t>m_gameType</a:t>
-            </a:r>
-            <a:endParaRPr lang="en-US" sz="1000" dirty="0" smtClean="0"/>
-          </a:p>
-          <a:p>
-            <a:pPr algn="ctr"/>
-            <a:r>
-              <a:rPr lang="en-US" sz="1000" dirty="0" err="1" smtClean="0"/>
-              <a:t>m_hasExtensionMod</a:t>
-            </a:r>
-            <a:endParaRPr lang="en-US" sz="1000" dirty="0" smtClean="0"/>
-          </a:p>
-          <a:p>
-            <a:pPr algn="ctr"/>
-            <a:r>
-              <a:rPr lang="en-US" sz="1000" dirty="0" err="1" smtClean="0"/>
-              <a:t>m_isBlizzardMap</a:t>
-            </a:r>
-            <a:endParaRPr lang="en-US" sz="1000" dirty="0" smtClean="0"/>
-          </a:p>
-          <a:p>
-            <a:pPr algn="ctr"/>
-            <a:r>
-              <a:rPr lang="en-US" sz="1000" dirty="0" err="1" smtClean="0"/>
-              <a:t>m_isCoopMode</a:t>
-            </a:r>
-            <a:endParaRPr lang="en-US" sz="1000" dirty="0" smtClean="0"/>
-          </a:p>
-          <a:p>
-            <a:pPr algn="ctr"/>
-            <a:r>
-              <a:rPr lang="en-US" sz="1000" dirty="0" err="1" smtClean="0"/>
-              <a:t>m_isPremadeFFA</a:t>
-            </a:r>
-            <a:endParaRPr lang="en-US" sz="1000" dirty="0" smtClean="0"/>
-          </a:p>
-          <a:p>
-            <a:pPr algn="ctr"/>
-            <a:r>
-              <a:rPr lang="en-US" sz="1000" dirty="0" err="1" smtClean="0"/>
-              <a:t>m_mapAuthorName</a:t>
-            </a:r>
-            <a:endParaRPr lang="en-US" sz="1000" dirty="0" smtClean="0"/>
-          </a:p>
-          <a:p>
-            <a:pPr algn="ctr"/>
-            <a:r>
-              <a:rPr lang="en-US" sz="1000" dirty="0" err="1" smtClean="0">
-                <a:solidFill>
-                  <a:srgbClr val="FF0000"/>
-                </a:solidFill>
-              </a:rPr>
-              <a:t>m_mapFileName</a:t>
             </a:r>
             <a:endParaRPr lang="en-US" sz="1000" dirty="0" smtClean="0">
               <a:solidFill>
@@ -6147,9 +5734,105 @@
             <a:pPr algn="ctr"/>
             <a:r>
               <a:rPr lang="en-US" sz="1000" dirty="0" err="1" smtClean="0"/>
+              <a:t>m_gameSpeed</a:t>
+            </a:r>
+            <a:endParaRPr lang="en-US" sz="1000" dirty="0" smtClean="0"/>
+          </a:p>
+          <a:p>
+            <a:pPr algn="ctr"/>
+            <a:r>
+              <a:rPr lang="en-US" sz="1000" dirty="0" err="1" smtClean="0"/>
+              <a:t>m_gameType</a:t>
+            </a:r>
+            <a:endParaRPr lang="en-US" sz="1000" dirty="0" smtClean="0"/>
+          </a:p>
+          <a:p>
+            <a:pPr algn="ctr"/>
+            <a:r>
+              <a:rPr lang="en-US" sz="1000" dirty="0" err="1" smtClean="0">
+                <a:solidFill>
+                  <a:srgbClr val="FF0000"/>
+                </a:solidFill>
+              </a:rPr>
+              <a:t>m_hasExtensionMod</a:t>
+            </a:r>
+            <a:endParaRPr lang="en-US" sz="1000" dirty="0" smtClean="0">
+              <a:solidFill>
+                <a:srgbClr val="FF0000"/>
+              </a:solidFill>
+            </a:endParaRPr>
+          </a:p>
+          <a:p>
+            <a:pPr algn="ctr"/>
+            <a:r>
+              <a:rPr lang="en-US" sz="1000" dirty="0" err="1" smtClean="0"/>
+              <a:t>m_isBlizzardMap</a:t>
+            </a:r>
+            <a:endParaRPr lang="en-US" sz="1000" dirty="0" smtClean="0"/>
+          </a:p>
+          <a:p>
+            <a:pPr algn="ctr"/>
+            <a:r>
+              <a:rPr lang="en-US" sz="1000" dirty="0" err="1" smtClean="0"/>
+              <a:t>m_isCoopMode</a:t>
+            </a:r>
+            <a:endParaRPr lang="en-US" sz="1000" dirty="0" smtClean="0"/>
+          </a:p>
+          <a:p>
+            <a:pPr algn="ctr"/>
+            <a:r>
+              <a:rPr lang="en-US" sz="1000" dirty="0" err="1" smtClean="0"/>
+              <a:t>m_isPremadeFFA</a:t>
+            </a:r>
+            <a:endParaRPr lang="en-US" sz="1000" dirty="0" smtClean="0"/>
+          </a:p>
+          <a:p>
+            <a:pPr algn="ctr"/>
+            <a:r>
+              <a:rPr lang="en-US" sz="1000" dirty="0" err="1" smtClean="0">
+                <a:solidFill>
+                  <a:srgbClr val="FF0000"/>
+                </a:solidFill>
+              </a:rPr>
+              <a:t>m_mapAuthorName</a:t>
+            </a:r>
+            <a:endParaRPr lang="en-US" sz="1000" dirty="0" smtClean="0">
+              <a:solidFill>
+                <a:srgbClr val="FF0000"/>
+              </a:solidFill>
+            </a:endParaRPr>
+          </a:p>
+          <a:p>
+            <a:pPr algn="ctr"/>
+            <a:r>
+              <a:rPr lang="en-US" sz="1000" dirty="0" err="1" smtClean="0">
+                <a:solidFill>
+                  <a:srgbClr val="FF0000"/>
+                </a:solidFill>
+              </a:rPr>
+              <a:t>m_mapFileName</a:t>
+            </a:r>
+            <a:endParaRPr lang="en-US" sz="1000" dirty="0" smtClean="0">
+              <a:solidFill>
+                <a:srgbClr val="FF0000"/>
+              </a:solidFill>
+            </a:endParaRPr>
+          </a:p>
+          <a:p>
+            <a:pPr algn="ctr"/>
+            <a:r>
+              <a:rPr lang="en-US" sz="1000" dirty="0" err="1" smtClean="0">
+                <a:solidFill>
+                  <a:srgbClr val="FF0000"/>
+                </a:solidFill>
+              </a:rPr>
               <a:t>m_mapFileSyncCheckSum</a:t>
             </a:r>
-            <a:endParaRPr lang="en-US" sz="1000" dirty="0" smtClean="0"/>
+            <a:endParaRPr lang="en-US" sz="1000" dirty="0" smtClean="0">
+              <a:solidFill>
+                <a:srgbClr val="FF0000"/>
+              </a:solidFill>
+            </a:endParaRPr>
           </a:p>
           <a:p>
             <a:pPr algn="ctr"/>
@@ -6170,18 +5853,34 @@
           <a:p>
             <a:pPr algn="ctr"/>
             <a:r>
-              <a:rPr lang="en-US" sz="1000" dirty="0" err="1" smtClean="0"/>
+              <a:rPr lang="en-US" sz="1000" dirty="0" err="1" smtClean="0">
+                <a:solidFill>
+                  <a:srgbClr val="FF0000"/>
+                </a:solidFill>
+              </a:rPr>
               <a:t>m_maxColors</a:t>
             </a:r>
-            <a:endParaRPr lang="en-US" sz="1000" dirty="0" smtClean="0"/>
-          </a:p>
-          <a:p>
-            <a:pPr algn="ctr"/>
-            <a:r>
-              <a:rPr lang="en-US" sz="1000" dirty="0" err="1" smtClean="0"/>
+            <a:endParaRPr lang="en-US" sz="1000" dirty="0" smtClean="0">
+              <a:solidFill>
+                <a:srgbClr val="FF0000"/>
+              </a:solidFill>
+            </a:endParaRPr>
+          </a:p>
+          <a:p>
+            <a:pPr algn="ctr"/>
+            <a:r>
+              <a:rPr lang="en-US" sz="1000" dirty="0" err="1" smtClean="0">
+                <a:solidFill>
+                  <a:srgbClr val="FF0000"/>
+                </a:solidFill>
+              </a:rPr>
               <a:t>m_maxControls</a:t>
             </a:r>
-            <a:endParaRPr lang="en-US" sz="1000" dirty="0" smtClean="0"/>
+            <a:endParaRPr lang="en-US" sz="1000" dirty="0" smtClean="0">
+              <a:solidFill>
+                <a:srgbClr val="FF0000"/>
+              </a:solidFill>
+            </a:endParaRPr>
           </a:p>
           <a:p>
             <a:pPr algn="ctr"/>
@@ -6226,10 +5925,18 @@
           <a:p>
             <a:pPr algn="ctr"/>
             <a:r>
-              <a:rPr lang="en-US" sz="1000" dirty="0" err="1" smtClean="0"/>
+              <a:rPr lang="en-US" sz="1000" dirty="0" err="1" smtClean="0">
+                <a:solidFill>
+                  <a:srgbClr val="FF0000"/>
+                </a:solidFill>
+              </a:rPr>
               <a:t>m_modFileSyncCheckSum</a:t>
             </a:r>
-            <a:endParaRPr lang="en-US" sz="1000" dirty="0" smtClean="0"/>
+            <a:endParaRPr lang="en-US" sz="1000" dirty="0" smtClean="0">
+              <a:solidFill>
+                <a:srgbClr val="FF0000"/>
+              </a:solidFill>
+            </a:endParaRPr>
           </a:p>
           <a:p>
             <a:pPr algn="ctr"/>
@@ -6286,26 +5993,50 @@
           <a:p>
             <a:pPr algn="ctr"/>
             <a:r>
-              <a:rPr lang="en-US" sz="1000" dirty="0" err="1" smtClean="0"/>
+              <a:rPr lang="en-US" sz="1000" dirty="0" err="1" smtClean="0">
+                <a:solidFill>
+                  <a:srgbClr val="FF0000"/>
+                </a:solidFill>
+              </a:rPr>
               <a:t>m_advancedSharedControl</a:t>
             </a:r>
-            <a:endParaRPr lang="en-US" sz="1000" dirty="0"/>
-          </a:p>
-          <a:p>
-            <a:pPr algn="ctr"/>
-            <a:r>
-              <a:rPr lang="en-US" sz="1000" dirty="0" err="1" smtClean="0"/>
+            <a:endParaRPr lang="en-US" sz="1000" dirty="0">
+              <a:solidFill>
+                <a:srgbClr val="FF0000"/>
+              </a:solidFill>
+            </a:endParaRPr>
+          </a:p>
+          <a:p>
+            <a:pPr algn="ctr"/>
+            <a:r>
+              <a:rPr lang="en-US" sz="1000" dirty="0" err="1" smtClean="0">
+                <a:solidFill>
+                  <a:srgbClr val="FF0000"/>
+                </a:solidFill>
+              </a:rPr>
               <a:t>m_amm</a:t>
             </a:r>
-            <a:endParaRPr lang="en-US" sz="1000" dirty="0" smtClean="0"/>
-          </a:p>
-          <a:p>
-            <a:pPr algn="ctr"/>
-            <a:r>
-              <a:rPr lang="en-US" sz="1000" dirty="0" err="1" smtClean="0"/>
+            <a:endParaRPr lang="en-US" sz="1000" dirty="0" smtClean="0">
+              <a:solidFill>
+                <a:srgbClr val="FF0000"/>
+              </a:solidFill>
+            </a:endParaRPr>
+          </a:p>
+          <a:p>
+            <a:pPr algn="ctr"/>
+            <a:r>
+              <a:rPr lang="en-US" sz="1000" dirty="0" err="1" smtClean="0">
+                <a:solidFill>
+                  <a:srgbClr val="FF0000"/>
+                </a:solidFill>
+              </a:rPr>
               <a:t>m_ammId</a:t>
             </a:r>
-            <a:endParaRPr lang="en-US" sz="1000" dirty="0" smtClean="0"/>
+            <a:endParaRPr lang="en-US" sz="1000" dirty="0" smtClean="0">
+              <a:solidFill>
+                <a:srgbClr val="FF0000"/>
+              </a:solidFill>
+            </a:endParaRPr>
           </a:p>
           <a:p>
             <a:pPr algn="ctr"/>
@@ -6318,10 +6049,18 @@
           <a:p>
             <a:pPr algn="ctr"/>
             <a:r>
-              <a:rPr lang="en-US" sz="1000" dirty="0" err="1" smtClean="0"/>
+              <a:rPr lang="en-US" sz="1000" dirty="0" err="1" smtClean="0">
+                <a:solidFill>
+                  <a:srgbClr val="FF0000"/>
+                </a:solidFill>
+              </a:rPr>
               <a:t>m_clientDebugFlags</a:t>
             </a:r>
-            <a:endParaRPr lang="en-US" sz="1000" dirty="0" smtClean="0"/>
+            <a:endParaRPr lang="en-US" sz="1000" dirty="0" smtClean="0">
+              <a:solidFill>
+                <a:srgbClr val="FF0000"/>
+              </a:solidFill>
+            </a:endParaRPr>
           </a:p>
           <a:p>
             <a:pPr algn="ctr"/>
@@ -6390,26 +6129,50 @@
           <a:p>
             <a:pPr algn="ctr"/>
             <a:r>
-              <a:rPr lang="en-US" sz="1000" dirty="0" err="1" smtClean="0"/>
+              <a:rPr lang="en-US" sz="1000" dirty="0" err="1" smtClean="0">
+                <a:solidFill>
+                  <a:srgbClr val="FF0000"/>
+                </a:solidFill>
+              </a:rPr>
               <a:t>m_randomRaces</a:t>
             </a:r>
-            <a:endParaRPr lang="en-US" sz="1000" dirty="0" smtClean="0"/>
-          </a:p>
-          <a:p>
-            <a:pPr algn="ctr"/>
-            <a:r>
-              <a:rPr lang="en-US" sz="1000" dirty="0" err="1" smtClean="0"/>
+            <a:endParaRPr lang="en-US" sz="1000" dirty="0" smtClean="0">
+              <a:solidFill>
+                <a:srgbClr val="FF0000"/>
+              </a:solidFill>
+            </a:endParaRPr>
+          </a:p>
+          <a:p>
+            <a:pPr algn="ctr"/>
+            <a:r>
+              <a:rPr lang="en-US" sz="1000" dirty="0" err="1" smtClean="0">
+                <a:solidFill>
+                  <a:srgbClr val="FF0000"/>
+                </a:solidFill>
+              </a:rPr>
               <a:t>m_teamsTogether</a:t>
             </a:r>
-            <a:endParaRPr lang="en-US" sz="1000" dirty="0" smtClean="0"/>
-          </a:p>
-          <a:p>
-            <a:pPr algn="ctr"/>
-            <a:r>
-              <a:rPr lang="en-US" sz="1000" dirty="0" err="1" smtClean="0"/>
-              <a:t>m_userDifficult</a:t>
-            </a:r>
-            <a:endParaRPr lang="en-US" sz="1000" dirty="0"/>
+            <a:endParaRPr lang="en-US" sz="1000" dirty="0" smtClean="0">
+              <a:solidFill>
+                <a:srgbClr val="FF0000"/>
+              </a:solidFill>
+            </a:endParaRPr>
+          </a:p>
+          <a:p>
+            <a:pPr algn="ctr"/>
+            <a:r>
+              <a:rPr lang="en-US" sz="1000" dirty="0" err="1" smtClean="0">
+                <a:solidFill>
+                  <a:srgbClr val="FF0000"/>
+                </a:solidFill>
+              </a:rPr>
+              <a:t>m_userDifficulty</a:t>
+            </a:r>
+            <a:endParaRPr lang="en-US" sz="1000" dirty="0">
+              <a:solidFill>
+                <a:srgbClr val="FF0000"/>
+              </a:solidFill>
+            </a:endParaRPr>
           </a:p>
         </p:txBody>
       </p:sp>
@@ -6969,18 +6732,34 @@
             <a:p>
               <a:pPr algn="ctr"/>
               <a:r>
-                <a:rPr lang="en-US" sz="1000" dirty="0" err="1" smtClean="0"/>
+                <a:rPr lang="en-US" sz="1000" dirty="0" err="1" smtClean="0">
+                  <a:solidFill>
+                    <a:srgbClr val="FF0000"/>
+                  </a:solidFill>
+                </a:rPr>
                 <a:t>m_control</a:t>
               </a:r>
-              <a:endParaRPr lang="en-US" sz="1000" dirty="0" smtClean="0"/>
+              <a:endParaRPr lang="en-US" sz="1000" dirty="0" smtClean="0">
+                <a:solidFill>
+                  <a:srgbClr val="FF0000"/>
+                </a:solidFill>
+              </a:endParaRPr>
             </a:p>
             <a:p>
               <a:pPr algn="ctr"/>
               <a:r>
-                <a:rPr lang="en-US" sz="1000" dirty="0" err="1" smtClean="0"/>
+                <a:rPr lang="en-US" sz="1000" dirty="0" err="1" smtClean="0">
+                  <a:solidFill>
+                    <a:srgbClr val="FF0000"/>
+                  </a:solidFill>
+                </a:rPr>
                 <a:t>m_difficulty</a:t>
               </a:r>
-              <a:endParaRPr lang="en-US" sz="1000" dirty="0" smtClean="0"/>
+              <a:endParaRPr lang="en-US" sz="1000" dirty="0" smtClean="0">
+                <a:solidFill>
+                  <a:srgbClr val="FF0000"/>
+                </a:solidFill>
+              </a:endParaRPr>
             </a:p>
             <a:p>
               <a:pPr algn="ctr"/>
@@ -7097,10 +6876,18 @@
             <a:p>
               <a:pPr algn="ctr"/>
               <a:r>
-                <a:rPr lang="en-US" sz="1000" dirty="0" err="1" smtClean="0"/>
+                <a:rPr lang="en-US" sz="1000" dirty="0" err="1" smtClean="0">
+                  <a:solidFill>
+                    <a:srgbClr val="FF0000"/>
+                  </a:solidFill>
+                </a:rPr>
                 <a:t>m_tandemLeaderUserId</a:t>
               </a:r>
-              <a:endParaRPr lang="en-US" sz="1000" dirty="0" smtClean="0"/>
+              <a:endParaRPr lang="en-US" sz="1000" dirty="0" smtClean="0">
+                <a:solidFill>
+                  <a:srgbClr val="FF0000"/>
+                </a:solidFill>
+              </a:endParaRPr>
             </a:p>
             <a:p>
               <a:pPr algn="ctr"/>
@@ -7129,10 +6916,18 @@
             <a:p>
               <a:pPr algn="ctr"/>
               <a:r>
-                <a:rPr lang="en-US" sz="1000" dirty="0" err="1" smtClean="0"/>
+                <a:rPr lang="en-US" sz="1000" dirty="0" err="1" smtClean="0">
+                  <a:solidFill>
+                    <a:srgbClr val="FF0000"/>
+                  </a:solidFill>
+                </a:rPr>
                 <a:t>m_workingSetSlotId</a:t>
               </a:r>
-              <a:endParaRPr lang="en-US" sz="1000" dirty="0"/>
+              <a:endParaRPr lang="en-US" sz="1000" dirty="0">
+                <a:solidFill>
+                  <a:srgbClr val="FF0000"/>
+                </a:solidFill>
+              </a:endParaRPr>
             </a:p>
           </p:txBody>
         </p:sp>
@@ -7251,7 +7046,7 @@
                     <a:srgbClr val="00B050"/>
                   </a:solidFill>
                 </a:rPr>
-                <a:t>m_workingSetSlotId</a:t>
+                <a:t>m_userId</a:t>
               </a:r>
               <a:endParaRPr lang="en-US" sz="1000" dirty="0" smtClean="0">
                 <a:solidFill>
@@ -7286,10 +7081,18 @@
             <a:p>
               <a:pPr algn="ctr"/>
               <a:r>
-                <a:rPr lang="en-US" sz="1000" dirty="0" err="1" smtClean="0"/>
+                <a:rPr lang="en-US" sz="1000" dirty="0" err="1" smtClean="0">
+                  <a:solidFill>
+                    <a:srgbClr val="FF0000"/>
+                  </a:solidFill>
+                </a:rPr>
                 <a:t>m_combinedRaceLevels</a:t>
               </a:r>
-              <a:endParaRPr lang="en-US" sz="1000" dirty="0" smtClean="0"/>
+              <a:endParaRPr lang="en-US" sz="1000" dirty="0" smtClean="0">
+                <a:solidFill>
+                  <a:srgbClr val="FF0000"/>
+                </a:solidFill>
+              </a:endParaRPr>
             </a:p>
             <a:p>
               <a:pPr algn="ctr"/>
@@ -7831,36 +7634,12 @@
           <a:p>
             <a:pPr algn="ctr"/>
             <a:r>
-              <a:rPr lang="en-US" sz="1000" dirty="0" err="1" smtClean="0"/>
+              <a:rPr lang="en-US" sz="1000" dirty="0" err="1" smtClean="0">
+                <a:solidFill>
+                  <a:srgbClr val="FF0000"/>
+                </a:solidFill>
+              </a:rPr>
               <a:t>m_count</a:t>
-            </a:r>
-            <a:endParaRPr lang="en-US" sz="1000" dirty="0" smtClean="0"/>
-          </a:p>
-          <a:p>
-            <a:pPr algn="ctr"/>
-            <a:r>
-              <a:rPr lang="en-US" sz="1000" dirty="0" err="1" smtClean="0"/>
-              <a:t>m_eventName</a:t>
-            </a:r>
-            <a:endParaRPr lang="en-US" sz="1000" dirty="0" smtClean="0"/>
-          </a:p>
-          <a:p>
-            <a:pPr algn="ctr"/>
-            <a:r>
-              <a:rPr lang="en-US" sz="1000" dirty="0" err="1" smtClean="0"/>
-              <a:t>m_firstUnitIndex</a:t>
-            </a:r>
-            <a:endParaRPr lang="en-US" sz="1000" dirty="0" smtClean="0"/>
-          </a:p>
-          <a:p>
-            <a:pPr algn="ctr"/>
-            <a:r>
-              <a:rPr lang="en-US" sz="1000" dirty="0" err="1" smtClean="0">
-                <a:solidFill>
-                  <a:srgbClr val="FF0000"/>
-                </a:solidFill>
-              </a:rPr>
-              <a:t>m_instanceList</a:t>
             </a:r>
             <a:endParaRPr lang="en-US" sz="1000" dirty="0" smtClean="0">
               <a:solidFill>
@@ -7871,12 +7650,28 @@
           <a:p>
             <a:pPr algn="ctr"/>
             <a:r>
+              <a:rPr lang="en-US" sz="1000" dirty="0" err="1" smtClean="0"/>
+              <a:t>m_eventName</a:t>
+            </a:r>
+            <a:endParaRPr lang="en-US" sz="1000" dirty="0" smtClean="0"/>
+          </a:p>
+          <a:p>
+            <a:pPr algn="ctr"/>
+            <a:r>
+              <a:rPr lang="en-US" sz="1000" dirty="0" err="1" smtClean="0"/>
+              <a:t>m_firstUnitIndex</a:t>
+            </a:r>
+            <a:endParaRPr lang="en-US" sz="1000" dirty="0" smtClean="0"/>
+          </a:p>
+          <a:p>
+            <a:pPr algn="ctr"/>
+            <a:r>
               <a:rPr lang="en-US" sz="1000" dirty="0" err="1" smtClean="0">
                 <a:solidFill>
                   <a:srgbClr val="FF0000"/>
                 </a:solidFill>
               </a:rPr>
-              <a:t>m_items</a:t>
+              <a:t>m_instanceList</a:t>
             </a:r>
             <a:endParaRPr lang="en-US" sz="1000" dirty="0" smtClean="0">
               <a:solidFill>
@@ -7887,6 +7682,22 @@
           <a:p>
             <a:pPr algn="ctr"/>
             <a:r>
+              <a:rPr lang="en-US" sz="1000" dirty="0" err="1" smtClean="0">
+                <a:solidFill>
+                  <a:srgbClr val="FF0000"/>
+                </a:solidFill>
+              </a:rPr>
+              <a:t>m_items</a:t>
+            </a:r>
+            <a:endParaRPr lang="en-US" sz="1000" dirty="0" smtClean="0">
+              <a:solidFill>
+                <a:srgbClr val="FF0000"/>
+              </a:solidFill>
+            </a:endParaRPr>
+          </a:p>
+          <a:p>
+            <a:pPr algn="ctr"/>
+            <a:r>
               <a:rPr lang="en-US" sz="1000" dirty="0" err="1" smtClean="0"/>
               <a:t>m_killerPlayerId</a:t>
             </a:r>
@@ -7895,42 +7706,82 @@
           <a:p>
             <a:pPr algn="ctr"/>
             <a:r>
-              <a:rPr lang="en-US" sz="1000" dirty="0" err="1" smtClean="0"/>
+              <a:rPr lang="en-US" sz="1000" dirty="0" err="1" smtClean="0">
+                <a:solidFill>
+                  <a:srgbClr val="FF0000"/>
+                </a:solidFill>
+              </a:rPr>
               <a:t>m_killerUnitTagIndex</a:t>
             </a:r>
-            <a:endParaRPr lang="en-US" sz="1000" dirty="0" smtClean="0"/>
-          </a:p>
-          <a:p>
-            <a:pPr algn="ctr"/>
-            <a:r>
-              <a:rPr lang="en-US" sz="1000" dirty="0" err="1" smtClean="0"/>
+            <a:endParaRPr lang="en-US" sz="1000" dirty="0" smtClean="0">
+              <a:solidFill>
+                <a:srgbClr val="FF0000"/>
+              </a:solidFill>
+            </a:endParaRPr>
+          </a:p>
+          <a:p>
+            <a:pPr algn="ctr"/>
+            <a:r>
+              <a:rPr lang="en-US" sz="1000" dirty="0" err="1" smtClean="0">
+                <a:solidFill>
+                  <a:srgbClr val="FF0000"/>
+                </a:solidFill>
+              </a:rPr>
               <a:t>m_killerUnitTagRecycle</a:t>
             </a:r>
-            <a:endParaRPr lang="en-US" sz="1000" dirty="0" smtClean="0"/>
-          </a:p>
-          <a:p>
-            <a:pPr algn="ctr"/>
-            <a:r>
-              <a:rPr lang="en-US" sz="1000" dirty="0" err="1" smtClean="0"/>
+            <a:endParaRPr lang="en-US" sz="1000" dirty="0" smtClean="0">
+              <a:solidFill>
+                <a:srgbClr val="FF0000"/>
+              </a:solidFill>
+            </a:endParaRPr>
+          </a:p>
+          <a:p>
+            <a:pPr algn="ctr"/>
+            <a:r>
+              <a:rPr lang="en-US" sz="1000" dirty="0" err="1" smtClean="0">
+                <a:solidFill>
+                  <a:srgbClr val="FF0000"/>
+                </a:solidFill>
+              </a:rPr>
               <a:t>m_playerId</a:t>
             </a:r>
-            <a:endParaRPr lang="en-US" sz="1000" dirty="0" smtClean="0"/>
-          </a:p>
-          <a:p>
-            <a:pPr algn="ctr"/>
-            <a:r>
-              <a:rPr lang="en-US" sz="1000" dirty="0" err="1" smtClean="0"/>
+            <a:endParaRPr lang="en-US" sz="1000" dirty="0" smtClean="0">
+              <a:solidFill>
+                <a:srgbClr val="FF0000"/>
+              </a:solidFill>
+            </a:endParaRPr>
+          </a:p>
+          <a:p>
+            <a:pPr algn="ctr"/>
+            <a:r>
+              <a:rPr lang="en-US" sz="1000" dirty="0" err="1" smtClean="0">
+                <a:solidFill>
+                  <a:srgbClr val="FF0000"/>
+                </a:solidFill>
+              </a:rPr>
               <a:t>m_slotId</a:t>
             </a:r>
-            <a:endParaRPr lang="en-US" sz="1000" dirty="0" smtClean="0"/>
-          </a:p>
-          <a:p>
-            <a:pPr algn="ctr"/>
-            <a:r>
-              <a:rPr lang="en-US" sz="1000" dirty="0" err="1" smtClean="0"/>
+            <a:endParaRPr lang="en-US" sz="1000" dirty="0" smtClean="0">
+              <a:solidFill>
+                <a:srgbClr val="FF0000"/>
+              </a:solidFill>
+            </a:endParaRPr>
+          </a:p>
+          <a:p>
+            <a:pPr algn="ctr"/>
+            <a:r>
+              <a:rPr lang="en-US" sz="1000" dirty="0" err="1" smtClean="0">
+                <a:solidFill>
+                  <a:srgbClr val="FF0000"/>
+                </a:solidFill>
+              </a:rPr>
               <a:t>m_type</a:t>
             </a:r>
-            <a:endParaRPr lang="en-US" sz="1000" dirty="0" smtClean="0"/>
+            <a:endParaRPr lang="en-US" sz="1000" dirty="0" smtClean="0">
+              <a:solidFill>
+                <a:srgbClr val="FF0000"/>
+              </a:solidFill>
+            </a:endParaRPr>
           </a:p>
           <a:p>
             <a:pPr algn="ctr"/>
@@ -7959,18 +7810,34 @@
           <a:p>
             <a:pPr algn="ctr"/>
             <a:r>
-              <a:rPr lang="en-US" sz="1000" dirty="0" err="1" smtClean="0"/>
+              <a:rPr lang="en-US" sz="1000" dirty="0" err="1" smtClean="0">
+                <a:solidFill>
+                  <a:srgbClr val="FF0000"/>
+                </a:solidFill>
+              </a:rPr>
               <a:t>m_upgradeTypeName</a:t>
             </a:r>
-            <a:endParaRPr lang="en-US" sz="1000" dirty="0" smtClean="0"/>
-          </a:p>
-          <a:p>
-            <a:pPr algn="ctr"/>
-            <a:r>
-              <a:rPr lang="en-US" sz="1000" dirty="0" err="1" smtClean="0"/>
+            <a:endParaRPr lang="en-US" sz="1000" dirty="0" smtClean="0">
+              <a:solidFill>
+                <a:srgbClr val="FF0000"/>
+              </a:solidFill>
+            </a:endParaRPr>
+          </a:p>
+          <a:p>
+            <a:pPr algn="ctr"/>
+            <a:r>
+              <a:rPr lang="en-US" sz="1000" dirty="0" err="1" smtClean="0">
+                <a:solidFill>
+                  <a:srgbClr val="FF0000"/>
+                </a:solidFill>
+              </a:rPr>
               <a:t>m_upkeepPlayerId</a:t>
             </a:r>
-            <a:endParaRPr lang="en-US" sz="1000" dirty="0" smtClean="0"/>
+            <a:endParaRPr lang="en-US" sz="1000" dirty="0" smtClean="0">
+              <a:solidFill>
+                <a:srgbClr val="FF0000"/>
+              </a:solidFill>
+            </a:endParaRPr>
           </a:p>
           <a:p>
             <a:pPr algn="ctr"/>
@@ -8007,7 +7874,7 @@
         <p:spPr>
           <a:xfrm>
             <a:off x="4419486" y="514374"/>
-            <a:ext cx="1003800" cy="2246769"/>
+            <a:ext cx="1003800" cy="2708434"/>
           </a:xfrm>
           <a:prstGeom prst="rect">
             <a:avLst/>
@@ -8064,6 +7931,17 @@
                   <a:srgbClr val="00B050"/>
                 </a:solidFill>
               </a:rPr>
+              <a:t>_bits</a:t>
+            </a:r>
+          </a:p>
+          <a:p>
+            <a:pPr algn="ctr"/>
+            <a:r>
+              <a:rPr lang="en-US" sz="1000" dirty="0" smtClean="0">
+                <a:solidFill>
+                  <a:srgbClr val="00B050"/>
+                </a:solidFill>
+              </a:rPr>
               <a:t>_</a:t>
             </a:r>
             <a:r>
@@ -8072,7 +7950,7 @@
                   <a:srgbClr val="00B050"/>
                 </a:solidFill>
               </a:rPr>
-              <a:t>gameloop</a:t>
+              <a:t>eventid</a:t>
             </a:r>
             <a:endParaRPr lang="en-US" sz="1000" dirty="0" smtClean="0">
               <a:solidFill>
@@ -8083,6 +7961,30 @@
           <a:p>
             <a:pPr algn="ctr"/>
             <a:r>
+              <a:rPr lang="en-US" sz="1000" dirty="0" smtClean="0">
+                <a:solidFill>
+                  <a:srgbClr val="00B050"/>
+                </a:solidFill>
+              </a:rPr>
+              <a:t>_</a:t>
+            </a:r>
+            <a:r>
+              <a:rPr lang="en-US" sz="1000" dirty="0" err="1" smtClean="0">
+                <a:solidFill>
+                  <a:srgbClr val="00B050"/>
+                </a:solidFill>
+              </a:rPr>
+              <a:t>gameloop</a:t>
+            </a:r>
+            <a:endParaRPr lang="en-US" sz="1000" dirty="0" smtClean="0">
+              <a:solidFill>
+                <a:srgbClr val="00B050"/>
+              </a:solidFill>
+            </a:endParaRPr>
+          </a:p>
+          <a:p>
+            <a:pPr algn="ctr"/>
+            <a:r>
               <a:rPr lang="en-US" sz="1000" dirty="0" err="1" smtClean="0"/>
               <a:t>CampID</a:t>
             </a:r>
@@ -8091,10 +7993,34 @@
           <a:p>
             <a:pPr algn="ctr"/>
             <a:r>
-              <a:rPr lang="en-US" sz="1000" dirty="0" err="1" smtClean="0"/>
+              <a:rPr lang="en-US" sz="1000" dirty="0" err="1" smtClean="0">
+                <a:solidFill>
+                  <a:srgbClr val="FF0000"/>
+                </a:solidFill>
+              </a:rPr>
               <a:t>PlayerID</a:t>
             </a:r>
-            <a:endParaRPr lang="en-US" sz="1000" dirty="0" smtClean="0"/>
+            <a:endParaRPr lang="en-US" sz="1000" dirty="0" smtClean="0">
+              <a:solidFill>
+                <a:srgbClr val="FF0000"/>
+              </a:solidFill>
+            </a:endParaRPr>
+          </a:p>
+          <a:p>
+            <a:pPr algn="ctr"/>
+            <a:r>
+              <a:rPr lang="en-US" sz="1000" dirty="0" err="1" smtClean="0">
+                <a:solidFill>
+                  <a:srgbClr val="00B050"/>
+                </a:solidFill>
+              </a:rPr>
+              <a:t>m_userId</a:t>
+            </a:r>
+            <a:endParaRPr lang="en-US" sz="1000" dirty="0" smtClean="0">
+              <a:solidFill>
+                <a:srgbClr val="00B050"/>
+              </a:solidFill>
+            </a:endParaRPr>
           </a:p>
           <a:p>
             <a:pPr algn="ctr"/>
@@ -8177,8 +8103,8 @@
         </p:nvCxnSpPr>
         <p:spPr>
           <a:xfrm flipV="1">
-            <a:off x="4014325" y="1637759"/>
-            <a:ext cx="405161" cy="1832777"/>
+            <a:off x="4014325" y="1868591"/>
+            <a:ext cx="405161" cy="1601945"/>
           </a:xfrm>
           <a:prstGeom prst="straightConnector1">
             <a:avLst/>
@@ -8210,8 +8136,8 @@
         </p:nvSpPr>
         <p:spPr>
           <a:xfrm>
-            <a:off x="4467173" y="3618327"/>
-            <a:ext cx="970137" cy="2708434"/>
+            <a:off x="4453149" y="3240685"/>
+            <a:ext cx="970137" cy="3016210"/>
           </a:xfrm>
           <a:prstGeom prst="rect">
             <a:avLst/>
@@ -8247,14 +8173,14 @@
           <a:p>
             <a:pPr algn="ctr"/>
             <a:r>
-              <a:rPr lang="en-US" sz="1000" dirty="0" err="1" smtClean="0">
+              <a:rPr lang="en-US" sz="1000" dirty="0" err="1">
                 <a:solidFill>
                   <a:srgbClr val="00B050"/>
                 </a:solidFill>
               </a:rPr>
               <a:t>replayId</a:t>
             </a:r>
-            <a:endParaRPr lang="en-US" sz="1000" dirty="0" smtClean="0">
+            <a:endParaRPr lang="en-US" sz="1000" dirty="0">
               <a:solidFill>
                 <a:srgbClr val="00B050"/>
               </a:solidFill>
@@ -8263,7 +8189,18 @@
           <a:p>
             <a:pPr algn="ctr"/>
             <a:r>
-              <a:rPr lang="en-US" sz="1000" dirty="0" smtClean="0">
+              <a:rPr lang="en-US" sz="1000" dirty="0">
+                <a:solidFill>
+                  <a:srgbClr val="00B050"/>
+                </a:solidFill>
+              </a:rPr>
+              <a:t>_bits</a:t>
+            </a:r>
+          </a:p>
+          <a:p>
+            <a:pPr algn="ctr"/>
+            <a:r>
+              <a:rPr lang="en-US" sz="1000" dirty="0">
                 <a:solidFill>
                   <a:srgbClr val="00B050"/>
                 </a:solidFill>
@@ -8271,14 +8208,38 @@
               <a:t>_</a:t>
             </a:r>
             <a:r>
-              <a:rPr lang="en-US" sz="1000" dirty="0" err="1" smtClean="0">
+              <a:rPr lang="en-US" sz="1000" dirty="0" err="1">
+                <a:solidFill>
+                  <a:srgbClr val="00B050"/>
+                </a:solidFill>
+              </a:rPr>
+              <a:t>eventid</a:t>
+            </a:r>
+            <a:endParaRPr lang="en-US" sz="1000" dirty="0">
+              <a:solidFill>
+                <a:srgbClr val="00B050"/>
+              </a:solidFill>
+            </a:endParaRPr>
+          </a:p>
+          <a:p>
+            <a:pPr algn="ctr"/>
+            <a:r>
+              <a:rPr lang="en-US" sz="1000" dirty="0">
+                <a:solidFill>
+                  <a:srgbClr val="00B050"/>
+                </a:solidFill>
+              </a:rPr>
+              <a:t>_</a:t>
+            </a:r>
+            <a:r>
+              <a:rPr lang="en-US" sz="1000" dirty="0" err="1">
                 <a:solidFill>
                   <a:srgbClr val="00B050"/>
                 </a:solidFill>
               </a:rPr>
               <a:t>gameloop</a:t>
             </a:r>
-            <a:endParaRPr lang="en-US" sz="1000" dirty="0" smtClean="0">
+            <a:endParaRPr lang="en-US" sz="1000" dirty="0">
               <a:solidFill>
                 <a:srgbClr val="00B050"/>
               </a:solidFill>
@@ -8399,7 +8360,7 @@
         <p:spPr>
           <a:xfrm>
             <a:off x="4014325" y="3470536"/>
-            <a:ext cx="452848" cy="1502008"/>
+            <a:ext cx="438824" cy="1278254"/>
           </a:xfrm>
           <a:prstGeom prst="straightConnector1">
             <a:avLst/>
@@ -8431,8 +8392,8 @@
         </p:nvSpPr>
         <p:spPr>
           <a:xfrm>
-            <a:off x="5911128" y="1143000"/>
-            <a:ext cx="1196160" cy="2400657"/>
+            <a:off x="6509208" y="514374"/>
+            <a:ext cx="1196160" cy="2708434"/>
           </a:xfrm>
           <a:prstGeom prst="rect">
             <a:avLst/>
@@ -8468,14 +8429,14 @@
           <a:p>
             <a:pPr algn="ctr"/>
             <a:r>
-              <a:rPr lang="en-US" sz="1000" dirty="0" err="1" smtClean="0">
+              <a:rPr lang="en-US" sz="1000" dirty="0" err="1">
                 <a:solidFill>
                   <a:srgbClr val="00B050"/>
                 </a:solidFill>
               </a:rPr>
               <a:t>replayId</a:t>
             </a:r>
-            <a:endParaRPr lang="en-US" sz="1000" dirty="0" smtClean="0">
+            <a:endParaRPr lang="en-US" sz="1000" dirty="0">
               <a:solidFill>
                 <a:srgbClr val="00B050"/>
               </a:solidFill>
@@ -8484,7 +8445,18 @@
           <a:p>
             <a:pPr algn="ctr"/>
             <a:r>
-              <a:rPr lang="en-US" sz="1000" dirty="0" smtClean="0">
+              <a:rPr lang="en-US" sz="1000" dirty="0">
+                <a:solidFill>
+                  <a:srgbClr val="00B050"/>
+                </a:solidFill>
+              </a:rPr>
+              <a:t>_bits</a:t>
+            </a:r>
+          </a:p>
+          <a:p>
+            <a:pPr algn="ctr"/>
+            <a:r>
+              <a:rPr lang="en-US" sz="1000" dirty="0">
                 <a:solidFill>
                   <a:srgbClr val="00B050"/>
                 </a:solidFill>
@@ -8492,14 +8464,38 @@
               <a:t>_</a:t>
             </a:r>
             <a:r>
-              <a:rPr lang="en-US" sz="1000" smtClean="0">
+              <a:rPr lang="en-US" sz="1000" dirty="0" err="1">
+                <a:solidFill>
+                  <a:srgbClr val="00B050"/>
+                </a:solidFill>
+              </a:rPr>
+              <a:t>eventid</a:t>
+            </a:r>
+            <a:endParaRPr lang="en-US" sz="1000" dirty="0">
+              <a:solidFill>
+                <a:srgbClr val="00B050"/>
+              </a:solidFill>
+            </a:endParaRPr>
+          </a:p>
+          <a:p>
+            <a:pPr algn="ctr"/>
+            <a:r>
+              <a:rPr lang="en-US" sz="1000" dirty="0">
+                <a:solidFill>
+                  <a:srgbClr val="00B050"/>
+                </a:solidFill>
+              </a:rPr>
+              <a:t>_</a:t>
+            </a:r>
+            <a:r>
+              <a:rPr lang="en-US" sz="1000" dirty="0" err="1">
                 <a:solidFill>
                   <a:srgbClr val="00B050"/>
                 </a:solidFill>
               </a:rPr>
               <a:t>gameloop</a:t>
             </a:r>
-            <a:endParaRPr lang="en-US" sz="1000" dirty="0" smtClean="0">
+            <a:endParaRPr lang="en-US" sz="1000" dirty="0">
               <a:solidFill>
                 <a:srgbClr val="00B050"/>
               </a:solidFill>
@@ -8614,8 +8610,8 @@
         </p:nvCxnSpPr>
         <p:spPr>
           <a:xfrm flipV="1">
-            <a:off x="4014325" y="2343329"/>
-            <a:ext cx="1896803" cy="1127207"/>
+            <a:off x="4014325" y="1868591"/>
+            <a:ext cx="2494883" cy="1601945"/>
           </a:xfrm>
           <a:prstGeom prst="straightConnector1">
             <a:avLst/>

</xml_diff>

<commit_message>
Fixed bug in populateTESubDicts() that would output the correct number of DataFrame rows for all players involved with killing another player, but would list one KillingPlayerId multiple times.
</commit_message>
<xml_diff>
--- a/tools/schema.pptx
+++ b/tools/schema.pptx
@@ -114,7 +114,7 @@
   </p:defaultTextStyle>
   <p:extLst>
     <p:ext uri="{EFAFB233-063F-42B5-8137-9DF3F51BA10A}">
-      <p15:sldGuideLst xmlns:p15="http://schemas.microsoft.com/office/powerpoint/2012/main" xmlns="">
+      <p15:sldGuideLst xmlns:p15="http://schemas.microsoft.com/office/powerpoint/2012/main">
         <p15:guide id="1" orient="horz" pos="2160">
           <p15:clr>
             <a:srgbClr val="A4A3A4"/>
@@ -213,7 +213,7 @@
           <a:p>
             <a:fld id="{E5C3572B-B504-4241-BED6-4B8AE9D8FF8C}" type="datetimeFigureOut">
               <a:rPr lang="en-US" smtClean="0"/>
-              <a:t>11/3/2016</a:t>
+              <a:t>11/3/16</a:t>
             </a:fld>
             <a:endParaRPr lang="en-US"/>
           </a:p>
@@ -1652,7 +1652,7 @@
           <a:p>
             <a:fld id="{CE21285F-E69F-4418-A392-A4F4A6F58DA9}" type="datetimeFigureOut">
               <a:rPr lang="en-US" smtClean="0"/>
-              <a:t>11/3/2016</a:t>
+              <a:t>11/3/16</a:t>
             </a:fld>
             <a:endParaRPr lang="en-US"/>
           </a:p>
@@ -1822,7 +1822,7 @@
           <a:p>
             <a:fld id="{CE21285F-E69F-4418-A392-A4F4A6F58DA9}" type="datetimeFigureOut">
               <a:rPr lang="en-US" smtClean="0"/>
-              <a:t>11/3/2016</a:t>
+              <a:t>11/3/16</a:t>
             </a:fld>
             <a:endParaRPr lang="en-US"/>
           </a:p>
@@ -2002,7 +2002,7 @@
           <a:p>
             <a:fld id="{CE21285F-E69F-4418-A392-A4F4A6F58DA9}" type="datetimeFigureOut">
               <a:rPr lang="en-US" smtClean="0"/>
-              <a:t>11/3/2016</a:t>
+              <a:t>11/3/16</a:t>
             </a:fld>
             <a:endParaRPr lang="en-US"/>
           </a:p>
@@ -2172,7 +2172,7 @@
           <a:p>
             <a:fld id="{CE21285F-E69F-4418-A392-A4F4A6F58DA9}" type="datetimeFigureOut">
               <a:rPr lang="en-US" smtClean="0"/>
-              <a:t>11/3/2016</a:t>
+              <a:t>11/3/16</a:t>
             </a:fld>
             <a:endParaRPr lang="en-US"/>
           </a:p>
@@ -2418,7 +2418,7 @@
           <a:p>
             <a:fld id="{CE21285F-E69F-4418-A392-A4F4A6F58DA9}" type="datetimeFigureOut">
               <a:rPr lang="en-US" smtClean="0"/>
-              <a:t>11/3/2016</a:t>
+              <a:t>11/3/16</a:t>
             </a:fld>
             <a:endParaRPr lang="en-US"/>
           </a:p>
@@ -2706,7 +2706,7 @@
           <a:p>
             <a:fld id="{CE21285F-E69F-4418-A392-A4F4A6F58DA9}" type="datetimeFigureOut">
               <a:rPr lang="en-US" smtClean="0"/>
-              <a:t>11/3/2016</a:t>
+              <a:t>11/3/16</a:t>
             </a:fld>
             <a:endParaRPr lang="en-US"/>
           </a:p>
@@ -3128,7 +3128,7 @@
           <a:p>
             <a:fld id="{CE21285F-E69F-4418-A392-A4F4A6F58DA9}" type="datetimeFigureOut">
               <a:rPr lang="en-US" smtClean="0"/>
-              <a:t>11/3/2016</a:t>
+              <a:t>11/3/16</a:t>
             </a:fld>
             <a:endParaRPr lang="en-US"/>
           </a:p>
@@ -3246,7 +3246,7 @@
           <a:p>
             <a:fld id="{CE21285F-E69F-4418-A392-A4F4A6F58DA9}" type="datetimeFigureOut">
               <a:rPr lang="en-US" smtClean="0"/>
-              <a:t>11/3/2016</a:t>
+              <a:t>11/3/16</a:t>
             </a:fld>
             <a:endParaRPr lang="en-US"/>
           </a:p>
@@ -3341,7 +3341,7 @@
           <a:p>
             <a:fld id="{CE21285F-E69F-4418-A392-A4F4A6F58DA9}" type="datetimeFigureOut">
               <a:rPr lang="en-US" smtClean="0"/>
-              <a:t>11/3/2016</a:t>
+              <a:t>11/3/16</a:t>
             </a:fld>
             <a:endParaRPr lang="en-US"/>
           </a:p>
@@ -3618,7 +3618,7 @@
           <a:p>
             <a:fld id="{CE21285F-E69F-4418-A392-A4F4A6F58DA9}" type="datetimeFigureOut">
               <a:rPr lang="en-US" smtClean="0"/>
-              <a:t>11/3/2016</a:t>
+              <a:t>11/3/16</a:t>
             </a:fld>
             <a:endParaRPr lang="en-US"/>
           </a:p>
@@ -3871,7 +3871,7 @@
           <a:p>
             <a:fld id="{CE21285F-E69F-4418-A392-A4F4A6F58DA9}" type="datetimeFigureOut">
               <a:rPr lang="en-US" smtClean="0"/>
-              <a:t>11/3/2016</a:t>
+              <a:t>11/3/16</a:t>
             </a:fld>
             <a:endParaRPr lang="en-US"/>
           </a:p>
@@ -4084,7 +4084,7 @@
           <a:p>
             <a:fld id="{CE21285F-E69F-4418-A392-A4F4A6F58DA9}" type="datetimeFigureOut">
               <a:rPr lang="en-US" smtClean="0"/>
-              <a:t>11/3/2016</a:t>
+              <a:t>11/3/16</a:t>
             </a:fld>
             <a:endParaRPr lang="en-US"/>
           </a:p>
@@ -8536,18 +8536,34 @@
           <a:p>
             <a:pPr algn="ctr"/>
             <a:r>
-              <a:rPr lang="en-US" sz="1000" dirty="0" err="1" smtClean="0"/>
+              <a:rPr lang="en-US" sz="1000" dirty="0" err="1" smtClean="0">
+                <a:solidFill>
+                  <a:srgbClr val="FF0000"/>
+                </a:solidFill>
+              </a:rPr>
               <a:t>GameTime</a:t>
             </a:r>
-            <a:endParaRPr lang="en-US" sz="1000" dirty="0" smtClean="0"/>
-          </a:p>
-          <a:p>
-            <a:pPr algn="ctr"/>
-            <a:r>
-              <a:rPr lang="en-US" sz="1000" dirty="0" err="1" smtClean="0"/>
+            <a:endParaRPr lang="en-US" sz="1000" dirty="0" smtClean="0">
+              <a:solidFill>
+                <a:srgbClr val="FF0000"/>
+              </a:solidFill>
+            </a:endParaRPr>
+          </a:p>
+          <a:p>
+            <a:pPr algn="ctr"/>
+            <a:r>
+              <a:rPr lang="en-US" sz="1000" dirty="0" err="1" smtClean="0">
+                <a:solidFill>
+                  <a:srgbClr val="FF0000"/>
+                </a:solidFill>
+              </a:rPr>
               <a:t>PreviousGameTime</a:t>
             </a:r>
-            <a:endParaRPr lang="en-US" sz="1000" dirty="0" smtClean="0"/>
+            <a:endParaRPr lang="en-US" sz="1000" dirty="0" smtClean="0">
+              <a:solidFill>
+                <a:srgbClr val="FF0000"/>
+              </a:solidFill>
+            </a:endParaRPr>
           </a:p>
           <a:p>
             <a:pPr algn="ctr"/>

</xml_diff>

<commit_message>
Began work on test script and truth data with new directory ./testData/ which holds raw outputs from each game type.
</commit_message>
<xml_diff>
--- a/tools/schema.pptx
+++ b/tools/schema.pptx
@@ -213,7 +213,7 @@
           <a:p>
             <a:fld id="{E5C3572B-B504-4241-BED6-4B8AE9D8FF8C}" type="datetimeFigureOut">
               <a:rPr lang="en-US" smtClean="0"/>
-              <a:t>11/3/16</a:t>
+              <a:t>11/6/16</a:t>
             </a:fld>
             <a:endParaRPr lang="en-US"/>
           </a:p>
@@ -1652,7 +1652,7 @@
           <a:p>
             <a:fld id="{CE21285F-E69F-4418-A392-A4F4A6F58DA9}" type="datetimeFigureOut">
               <a:rPr lang="en-US" smtClean="0"/>
-              <a:t>11/3/16</a:t>
+              <a:t>11/6/16</a:t>
             </a:fld>
             <a:endParaRPr lang="en-US"/>
           </a:p>
@@ -1822,7 +1822,7 @@
           <a:p>
             <a:fld id="{CE21285F-E69F-4418-A392-A4F4A6F58DA9}" type="datetimeFigureOut">
               <a:rPr lang="en-US" smtClean="0"/>
-              <a:t>11/3/16</a:t>
+              <a:t>11/6/16</a:t>
             </a:fld>
             <a:endParaRPr lang="en-US"/>
           </a:p>
@@ -2002,7 +2002,7 @@
           <a:p>
             <a:fld id="{CE21285F-E69F-4418-A392-A4F4A6F58DA9}" type="datetimeFigureOut">
               <a:rPr lang="en-US" smtClean="0"/>
-              <a:t>11/3/16</a:t>
+              <a:t>11/6/16</a:t>
             </a:fld>
             <a:endParaRPr lang="en-US"/>
           </a:p>
@@ -2172,7 +2172,7 @@
           <a:p>
             <a:fld id="{CE21285F-E69F-4418-A392-A4F4A6F58DA9}" type="datetimeFigureOut">
               <a:rPr lang="en-US" smtClean="0"/>
-              <a:t>11/3/16</a:t>
+              <a:t>11/6/16</a:t>
             </a:fld>
             <a:endParaRPr lang="en-US"/>
           </a:p>
@@ -2418,7 +2418,7 @@
           <a:p>
             <a:fld id="{CE21285F-E69F-4418-A392-A4F4A6F58DA9}" type="datetimeFigureOut">
               <a:rPr lang="en-US" smtClean="0"/>
-              <a:t>11/3/16</a:t>
+              <a:t>11/6/16</a:t>
             </a:fld>
             <a:endParaRPr lang="en-US"/>
           </a:p>
@@ -2706,7 +2706,7 @@
           <a:p>
             <a:fld id="{CE21285F-E69F-4418-A392-A4F4A6F58DA9}" type="datetimeFigureOut">
               <a:rPr lang="en-US" smtClean="0"/>
-              <a:t>11/3/16</a:t>
+              <a:t>11/6/16</a:t>
             </a:fld>
             <a:endParaRPr lang="en-US"/>
           </a:p>
@@ -3128,7 +3128,7 @@
           <a:p>
             <a:fld id="{CE21285F-E69F-4418-A392-A4F4A6F58DA9}" type="datetimeFigureOut">
               <a:rPr lang="en-US" smtClean="0"/>
-              <a:t>11/3/16</a:t>
+              <a:t>11/6/16</a:t>
             </a:fld>
             <a:endParaRPr lang="en-US"/>
           </a:p>
@@ -3246,7 +3246,7 @@
           <a:p>
             <a:fld id="{CE21285F-E69F-4418-A392-A4F4A6F58DA9}" type="datetimeFigureOut">
               <a:rPr lang="en-US" smtClean="0"/>
-              <a:t>11/3/16</a:t>
+              <a:t>11/6/16</a:t>
             </a:fld>
             <a:endParaRPr lang="en-US"/>
           </a:p>
@@ -3341,7 +3341,7 @@
           <a:p>
             <a:fld id="{CE21285F-E69F-4418-A392-A4F4A6F58DA9}" type="datetimeFigureOut">
               <a:rPr lang="en-US" smtClean="0"/>
-              <a:t>11/3/16</a:t>
+              <a:t>11/6/16</a:t>
             </a:fld>
             <a:endParaRPr lang="en-US"/>
           </a:p>
@@ -3618,7 +3618,7 @@
           <a:p>
             <a:fld id="{CE21285F-E69F-4418-A392-A4F4A6F58DA9}" type="datetimeFigureOut">
               <a:rPr lang="en-US" smtClean="0"/>
-              <a:t>11/3/16</a:t>
+              <a:t>11/6/16</a:t>
             </a:fld>
             <a:endParaRPr lang="en-US"/>
           </a:p>
@@ -3871,7 +3871,7 @@
           <a:p>
             <a:fld id="{CE21285F-E69F-4418-A392-A4F4A6F58DA9}" type="datetimeFigureOut">
               <a:rPr lang="en-US" smtClean="0"/>
-              <a:t>11/3/16</a:t>
+              <a:t>11/6/16</a:t>
             </a:fld>
             <a:endParaRPr lang="en-US"/>
           </a:p>
@@ -4084,7 +4084,7 @@
           <a:p>
             <a:fld id="{CE21285F-E69F-4418-A392-A4F4A6F58DA9}" type="datetimeFigureOut">
               <a:rPr lang="en-US" smtClean="0"/>
-              <a:t>11/3/16</a:t>
+              <a:t>11/6/16</a:t>
             </a:fld>
             <a:endParaRPr lang="en-US"/>
           </a:p>
@@ -5690,39 +5690,12 @@
           <a:p>
             <a:pPr algn="ctr"/>
             <a:r>
-              <a:rPr lang="en-US" sz="1000" dirty="0" err="1" smtClean="0"/>
+              <a:rPr lang="en-US" sz="1000" dirty="0" err="1" smtClean="0">
+                <a:solidFill>
+                  <a:srgbClr val="FF0000"/>
+                </a:solidFill>
+              </a:rPr>
               <a:t>m_defaultAIBuild</a:t>
-            </a:r>
-            <a:endParaRPr lang="en-US" sz="1000" dirty="0" smtClean="0"/>
-          </a:p>
-          <a:p>
-            <a:pPr algn="ctr"/>
-            <a:r>
-              <a:rPr lang="en-US" sz="1000" dirty="0" err="1" smtClean="0">
-                <a:solidFill>
-                  <a:srgbClr val="FF0000"/>
-                </a:solidFill>
-              </a:rPr>
-              <a:t>m_defaultDifficulty</a:t>
-            </a:r>
-            <a:r>
-              <a:rPr lang="en-US" sz="1000" dirty="0" smtClean="0">
-                <a:solidFill>
-                  <a:srgbClr val="FF0000"/>
-                </a:solidFill>
-              </a:rPr>
-              <a:t> </a:t>
-            </a:r>
-          </a:p>
-          <a:p>
-            <a:pPr algn="ctr"/>
-            <a:r>
-              <a:rPr lang="en-US" sz="1000" dirty="0" err="1" smtClean="0">
-                <a:solidFill>
-                  <a:srgbClr val="FF0000"/>
-                </a:solidFill>
-              </a:rPr>
-              <a:t>m_gameCacheName</a:t>
             </a:r>
             <a:endParaRPr lang="en-US" sz="1000" dirty="0" smtClean="0">
               <a:solidFill>
@@ -5733,28 +5706,31 @@
           <a:p>
             <a:pPr algn="ctr"/>
             <a:r>
-              <a:rPr lang="en-US" sz="1000" dirty="0" err="1" smtClean="0"/>
-              <a:t>m_gameSpeed</a:t>
-            </a:r>
-            <a:endParaRPr lang="en-US" sz="1000" dirty="0" smtClean="0"/>
-          </a:p>
-          <a:p>
-            <a:pPr algn="ctr"/>
-            <a:r>
-              <a:rPr lang="en-US" sz="1000" dirty="0" err="1" smtClean="0"/>
-              <a:t>m_gameType</a:t>
-            </a:r>
-            <a:endParaRPr lang="en-US" sz="1000" dirty="0" smtClean="0"/>
-          </a:p>
-          <a:p>
-            <a:pPr algn="ctr"/>
-            <a:r>
               <a:rPr lang="en-US" sz="1000" dirty="0" err="1" smtClean="0">
                 <a:solidFill>
                   <a:srgbClr val="FF0000"/>
                 </a:solidFill>
               </a:rPr>
-              <a:t>m_hasExtensionMod</a:t>
+              <a:t>m_defaultDifficulty</a:t>
+            </a:r>
+            <a:r>
+              <a:rPr lang="en-US" sz="1000" dirty="0" smtClean="0">
+                <a:solidFill>
+                  <a:srgbClr val="FF0000"/>
+                </a:solidFill>
+              </a:rPr>
+              <a:t> </a:t>
+            </a:r>
+          </a:p>
+          <a:p>
+            <a:pPr algn="ctr"/>
+            <a:r>
+              <a:rPr lang="en-US" sz="1000" dirty="0" err="1" smtClean="0">
+                <a:solidFill>
+                  <a:srgbClr val="FF0000"/>
+                </a:solidFill>
+              </a:rPr>
+              <a:t>m_gameCacheName</a:t>
             </a:r>
             <a:endParaRPr lang="en-US" sz="1000" dirty="0" smtClean="0">
               <a:solidFill>
@@ -5766,6 +5742,46 @@
             <a:pPr algn="ctr"/>
             <a:r>
               <a:rPr lang="en-US" sz="1000" dirty="0" err="1" smtClean="0"/>
+              <a:t>m_gameSpeed</a:t>
+            </a:r>
+            <a:endParaRPr lang="en-US" sz="1000" dirty="0" smtClean="0"/>
+          </a:p>
+          <a:p>
+            <a:pPr algn="ctr"/>
+            <a:r>
+              <a:rPr lang="en-US" sz="1000" dirty="0" err="1" smtClean="0">
+                <a:solidFill>
+                  <a:srgbClr val="FF0000"/>
+                </a:solidFill>
+              </a:rPr>
+              <a:t>m_gameType</a:t>
+            </a:r>
+            <a:endParaRPr lang="en-US" sz="1000" dirty="0" smtClean="0">
+              <a:solidFill>
+                <a:srgbClr val="FF0000"/>
+              </a:solidFill>
+            </a:endParaRPr>
+          </a:p>
+          <a:p>
+            <a:pPr algn="ctr"/>
+            <a:r>
+              <a:rPr lang="en-US" sz="1000" dirty="0" err="1" smtClean="0">
+                <a:solidFill>
+                  <a:srgbClr val="FF0000"/>
+                </a:solidFill>
+              </a:rPr>
+              <a:t>m_hasExtensionMod</a:t>
+            </a:r>
+            <a:endParaRPr lang="en-US" sz="1000" dirty="0" smtClean="0">
+              <a:solidFill>
+                <a:srgbClr val="FF0000"/>
+              </a:solidFill>
+            </a:endParaRPr>
+          </a:p>
+          <a:p>
+            <a:pPr algn="ctr"/>
+            <a:r>
+              <a:rPr lang="en-US" sz="1000" dirty="0" err="1" smtClean="0"/>
               <a:t>m_isBlizzardMap</a:t>
             </a:r>
             <a:endParaRPr lang="en-US" sz="1000" dirty="0" smtClean="0"/>
@@ -5773,18 +5789,34 @@
           <a:p>
             <a:pPr algn="ctr"/>
             <a:r>
-              <a:rPr lang="en-US" sz="1000" dirty="0" err="1" smtClean="0"/>
+              <a:rPr lang="en-US" sz="1000" dirty="0" err="1" smtClean="0">
+                <a:solidFill>
+                  <a:srgbClr val="FF0000"/>
+                </a:solidFill>
+              </a:rPr>
               <a:t>m_isCoopMode</a:t>
             </a:r>
-            <a:endParaRPr lang="en-US" sz="1000" dirty="0" smtClean="0"/>
-          </a:p>
-          <a:p>
-            <a:pPr algn="ctr"/>
-            <a:r>
-              <a:rPr lang="en-US" sz="1000" dirty="0" err="1" smtClean="0"/>
+            <a:endParaRPr lang="en-US" sz="1000" dirty="0" smtClean="0">
+              <a:solidFill>
+                <a:srgbClr val="FF0000"/>
+              </a:solidFill>
+            </a:endParaRPr>
+          </a:p>
+          <a:p>
+            <a:pPr algn="ctr"/>
+            <a:r>
+              <a:rPr lang="en-US" sz="1000" dirty="0" err="1" smtClean="0">
+                <a:solidFill>
+                  <a:srgbClr val="FF0000"/>
+                </a:solidFill>
+              </a:rPr>
               <a:t>m_isPremadeFFA</a:t>
             </a:r>
-            <a:endParaRPr lang="en-US" sz="1000" dirty="0" smtClean="0"/>
+            <a:endParaRPr lang="en-US" sz="1000" dirty="0" smtClean="0">
+              <a:solidFill>
+                <a:srgbClr val="FF0000"/>
+              </a:solidFill>
+            </a:endParaRPr>
           </a:p>
           <a:p>
             <a:pPr algn="ctr"/>
@@ -6011,10 +6043,42 @@
             <a:r>
               <a:rPr lang="en-US" sz="1000" dirty="0" err="1" smtClean="0">
                 <a:solidFill>
-                  <a:srgbClr val="FF0000"/>
+                  <a:schemeClr val="tx1"/>
                 </a:solidFill>
               </a:rPr>
               <a:t>m_amm</a:t>
+            </a:r>
+            <a:endParaRPr lang="en-US" sz="1000" dirty="0" smtClean="0">
+              <a:solidFill>
+                <a:schemeClr val="tx1"/>
+              </a:solidFill>
+            </a:endParaRPr>
+          </a:p>
+          <a:p>
+            <a:pPr algn="ctr"/>
+            <a:r>
+              <a:rPr lang="en-US" sz="1000" dirty="0" err="1" smtClean="0">
+                <a:solidFill>
+                  <a:schemeClr val="tx1"/>
+                </a:solidFill>
+              </a:rPr>
+              <a:t>m_ammId</a:t>
+            </a:r>
+            <a:endParaRPr lang="en-US" sz="1000" dirty="0" smtClean="0">
+              <a:solidFill>
+                <a:schemeClr val="tx1"/>
+              </a:solidFill>
+            </a:endParaRPr>
+          </a:p>
+          <a:p>
+            <a:pPr algn="ctr"/>
+            <a:r>
+              <a:rPr lang="en-US" sz="1000" dirty="0" err="1" smtClean="0">
+                <a:solidFill>
+                  <a:srgbClr val="FF0000"/>
+                </a:solidFill>
+              </a:rPr>
+              <a:t>m_battleNet</a:t>
             </a:r>
             <a:endParaRPr lang="en-US" sz="1000" dirty="0" smtClean="0">
               <a:solidFill>
@@ -6030,7 +6094,7 @@
                   <a:srgbClr val="FF0000"/>
                 </a:solidFill>
               </a:rPr>
-              <a:t>m_ammId</a:t>
+              <a:t>m_clientDebugFlags</a:t>
             </a:r>
             <a:endParaRPr lang="en-US" sz="1000" dirty="0" smtClean="0">
               <a:solidFill>
@@ -6041,20 +6105,12 @@
           <a:p>
             <a:pPr algn="ctr"/>
             <a:r>
-              <a:rPr lang="en-US" sz="1000" dirty="0" err="1" smtClean="0"/>
-              <a:t>m_battleNet</a:t>
-            </a:r>
-            <a:endParaRPr lang="en-US" sz="1000" dirty="0" smtClean="0"/>
-          </a:p>
-          <a:p>
-            <a:pPr algn="ctr"/>
-            <a:r>
               <a:rPr lang="en-US" sz="1000" dirty="0" err="1" smtClean="0">
                 <a:solidFill>
                   <a:srgbClr val="FF0000"/>
                 </a:solidFill>
               </a:rPr>
-              <a:t>m_clientDebugFlags</a:t>
+              <a:t>m_competitive</a:t>
             </a:r>
             <a:endParaRPr lang="en-US" sz="1000" dirty="0" smtClean="0">
               <a:solidFill>
@@ -6065,26 +6121,34 @@
           <a:p>
             <a:pPr algn="ctr"/>
             <a:r>
-              <a:rPr lang="en-US" sz="1000" dirty="0" err="1" smtClean="0"/>
-              <a:t>m_competitive</a:t>
-            </a:r>
-            <a:endParaRPr lang="en-US" sz="1000" dirty="0" smtClean="0"/>
-          </a:p>
-          <a:p>
-            <a:pPr algn="ctr"/>
-            <a:r>
-              <a:rPr lang="en-US" sz="1000" dirty="0" err="1" smtClean="0"/>
+              <a:rPr lang="en-US" sz="1000" dirty="0" err="1" smtClean="0">
+                <a:solidFill>
+                  <a:srgbClr val="FF0000"/>
+                </a:solidFill>
+              </a:rPr>
               <a:t>m_cooperative</a:t>
             </a:r>
-            <a:endParaRPr lang="en-US" sz="1000" dirty="0" smtClean="0"/>
-          </a:p>
-          <a:p>
-            <a:pPr algn="ctr"/>
-            <a:r>
-              <a:rPr lang="en-US" sz="1000" dirty="0" err="1" smtClean="0"/>
+            <a:endParaRPr lang="en-US" sz="1000" dirty="0" smtClean="0">
+              <a:solidFill>
+                <a:srgbClr val="FF0000"/>
+              </a:solidFill>
+            </a:endParaRPr>
+          </a:p>
+          <a:p>
+            <a:pPr algn="ctr"/>
+            <a:r>
+              <a:rPr lang="en-US" sz="1000" dirty="0" err="1" smtClean="0">
+                <a:solidFill>
+                  <a:srgbClr val="FF0000"/>
+                </a:solidFill>
+              </a:rPr>
               <a:t>m_fog</a:t>
             </a:r>
-            <a:endParaRPr lang="en-US" sz="1000" dirty="0" smtClean="0"/>
+            <a:endParaRPr lang="en-US" sz="1000" dirty="0" smtClean="0">
+              <a:solidFill>
+                <a:srgbClr val="FF0000"/>
+              </a:solidFill>
+            </a:endParaRPr>
           </a:p>
           <a:p>
             <a:pPr algn="ctr"/>
@@ -6105,10 +6169,18 @@
           <a:p>
             <a:pPr algn="ctr"/>
             <a:r>
-              <a:rPr lang="en-US" sz="1000" dirty="0" err="1" smtClean="0"/>
+              <a:rPr lang="en-US" sz="1000" dirty="0" err="1" smtClean="0">
+                <a:solidFill>
+                  <a:srgbClr val="FF0000"/>
+                </a:solidFill>
+              </a:rPr>
               <a:t>m_noVictoryOrDefeat</a:t>
             </a:r>
-            <a:endParaRPr lang="en-US" sz="1000" dirty="0" smtClean="0"/>
+            <a:endParaRPr lang="en-US" sz="1000" dirty="0" smtClean="0">
+              <a:solidFill>
+                <a:srgbClr val="FF0000"/>
+              </a:solidFill>
+            </a:endParaRPr>
           </a:p>
           <a:p>
             <a:pPr algn="ctr"/>
@@ -6121,10 +6193,18 @@
           <a:p>
             <a:pPr algn="ctr"/>
             <a:r>
-              <a:rPr lang="en-US" sz="1000" dirty="0" err="1" smtClean="0"/>
+              <a:rPr lang="en-US" sz="1000" dirty="0" err="1" smtClean="0">
+                <a:solidFill>
+                  <a:srgbClr val="FF0000"/>
+                </a:solidFill>
+              </a:rPr>
               <a:t>m_practice</a:t>
             </a:r>
-            <a:endParaRPr lang="en-US" sz="1000" dirty="0" smtClean="0"/>
+            <a:endParaRPr lang="en-US" sz="1000" dirty="0" smtClean="0">
+              <a:solidFill>
+                <a:srgbClr val="FF0000"/>
+              </a:solidFill>
+            </a:endParaRPr>
           </a:p>
           <a:p>
             <a:pPr algn="ctr"/>

</xml_diff>